<commit_message>
updated ppt with parts list and added first daily log
</commit_message>
<xml_diff>
--- a/doc/runningWasp.pptx
+++ b/doc/runningWasp.pptx
@@ -7,8 +7,9 @@
   <p:sldIdLst>
     <p:sldId id="256" r:id="rId2"/>
     <p:sldId id="257" r:id="rId3"/>
-    <p:sldId id="258" r:id="rId4"/>
-    <p:sldId id="259" r:id="rId5"/>
+    <p:sldId id="260" r:id="rId4"/>
+    <p:sldId id="258" r:id="rId5"/>
+    <p:sldId id="259" r:id="rId6"/>
   </p:sldIdLst>
   <p:sldSz cx="12192000" cy="6858000"/>
   <p:notesSz cx="6858000" cy="9144000"/>
@@ -14227,8 +14228,24 @@
           <a:lstStyle/>
           <a:p>
             <a:r>
+              <a:rPr lang="en-US" dirty="0" err="1" smtClean="0"/>
+              <a:t>Matériel</a:t>
+            </a:r>
+            <a:r>
               <a:rPr lang="en-US" dirty="0" smtClean="0"/>
-              <a:t>Planning</a:t>
+              <a:t> </a:t>
+            </a:r>
+            <a:r>
+              <a:rPr lang="en-US" dirty="0" err="1" smtClean="0"/>
+              <a:t>nécessaire</a:t>
+            </a:r>
+            <a:r>
+              <a:rPr lang="en-US" dirty="0" smtClean="0"/>
+              <a:t> sur </a:t>
+            </a:r>
+            <a:r>
+              <a:rPr lang="en-US" smtClean="0"/>
+              <a:t>waspmote</a:t>
             </a:r>
             <a:endParaRPr lang="en-US" dirty="0"/>
           </a:p>
@@ -14251,6 +14268,111 @@
           <a:p>
             <a:r>
               <a:rPr lang="en-US" dirty="0" smtClean="0"/>
+              <a:t>1x </a:t>
+            </a:r>
+            <a:r>
+              <a:rPr lang="en-US" dirty="0" err="1" smtClean="0"/>
+              <a:t>Waspmote</a:t>
+            </a:r>
+            <a:endParaRPr lang="en-US" dirty="0" smtClean="0"/>
+          </a:p>
+          <a:p>
+            <a:r>
+              <a:rPr lang="en-US" dirty="0" smtClean="0"/>
+              <a:t>1x Battery pack USB</a:t>
+            </a:r>
+          </a:p>
+          <a:p>
+            <a:r>
+              <a:rPr lang="en-US" dirty="0" smtClean="0"/>
+              <a:t>1x Module GPRS/GPS</a:t>
+            </a:r>
+          </a:p>
+          <a:p>
+            <a:r>
+              <a:rPr lang="en-US" dirty="0" smtClean="0"/>
+              <a:t>1x Module Wi-Fi</a:t>
+            </a:r>
+          </a:p>
+          <a:p>
+            <a:r>
+              <a:rPr lang="en-US" dirty="0" smtClean="0"/>
+              <a:t>1x Carte Micro-SD</a:t>
+            </a:r>
+            <a:endParaRPr lang="en-US" dirty="0"/>
+          </a:p>
+        </p:txBody>
+      </p:sp>
+    </p:spTree>
+    <p:extLst>
+      <p:ext uri="{BB962C8B-B14F-4D97-AF65-F5344CB8AC3E}">
+        <p14:creationId xmlns:p14="http://schemas.microsoft.com/office/powerpoint/2010/main" val="685127128"/>
+      </p:ext>
+    </p:extLst>
+  </p:cSld>
+  <p:clrMapOvr>
+    <a:masterClrMapping/>
+  </p:clrMapOvr>
+</p:sld>
+</file>
+
+<file path=ppt/slides/slide4.xml><?xml version="1.0" encoding="utf-8"?>
+<p:sld xmlns:a="http://schemas.openxmlformats.org/drawingml/2006/main" xmlns:r="http://schemas.openxmlformats.org/officeDocument/2006/relationships" xmlns:p="http://schemas.openxmlformats.org/presentationml/2006/main">
+  <p:cSld>
+    <p:spTree>
+      <p:nvGrpSpPr>
+        <p:cNvPr id="1" name=""/>
+        <p:cNvGrpSpPr/>
+        <p:nvPr/>
+      </p:nvGrpSpPr>
+      <p:grpSpPr>
+        <a:xfrm>
+          <a:off x="0" y="0"/>
+          <a:ext cx="0" cy="0"/>
+          <a:chOff x="0" y="0"/>
+          <a:chExt cx="0" cy="0"/>
+        </a:xfrm>
+      </p:grpSpPr>
+      <p:sp>
+        <p:nvSpPr>
+          <p:cNvPr id="2" name="Title 1"/>
+          <p:cNvSpPr>
+            <a:spLocks noGrp="1"/>
+          </p:cNvSpPr>
+          <p:nvPr>
+            <p:ph type="title"/>
+          </p:nvPr>
+        </p:nvSpPr>
+        <p:spPr/>
+        <p:txBody>
+          <a:bodyPr/>
+          <a:lstStyle/>
+          <a:p>
+            <a:r>
+              <a:rPr lang="en-US" dirty="0" smtClean="0"/>
+              <a:t>Planning</a:t>
+            </a:r>
+            <a:endParaRPr lang="en-US" dirty="0"/>
+          </a:p>
+        </p:txBody>
+      </p:sp>
+      <p:sp>
+        <p:nvSpPr>
+          <p:cNvPr id="3" name="Content Placeholder 2"/>
+          <p:cNvSpPr>
+            <a:spLocks noGrp="1"/>
+          </p:cNvSpPr>
+          <p:nvPr>
+            <p:ph idx="1"/>
+          </p:nvPr>
+        </p:nvSpPr>
+        <p:spPr/>
+        <p:txBody>
+          <a:bodyPr anchor="ctr"/>
+          <a:lstStyle/>
+          <a:p>
+            <a:r>
+              <a:rPr lang="en-US" dirty="0" smtClean="0"/>
               <a:t>1ère </a:t>
             </a:r>
             <a:r>
@@ -14350,7 +14472,7 @@
 </p:sld>
 </file>
 
-<file path=ppt/slides/slide4.xml><?xml version="1.0" encoding="utf-8"?>
+<file path=ppt/slides/slide5.xml><?xml version="1.0" encoding="utf-8"?>
 <p:sld xmlns:a="http://schemas.openxmlformats.org/drawingml/2006/main" xmlns:r="http://schemas.openxmlformats.org/officeDocument/2006/relationships" xmlns:p="http://schemas.openxmlformats.org/presentationml/2006/main">
   <p:cSld>
     <p:spTree>

</xml_diff>

<commit_message>
last update to ppt
</commit_message>
<xml_diff>
--- a/doc/runningWasp.pptx
+++ b/doc/runningWasp.pptx
@@ -763,7 +763,7 @@
             <a:fld id="{5923F103-BC34-4FE4-A40E-EDDEECFDA5D0}" type="datetimeFigureOut">
               <a:rPr lang="en-US" smtClean="0"/>
               <a:pPr/>
-              <a:t>8/29/16</a:t>
+              <a:t>8/30/16</a:t>
             </a:fld>
             <a:endParaRPr lang="en-US" dirty="0"/>
           </a:p>
@@ -1889,7 +1889,7 @@
           <a:p>
             <a:fld id="{923A1CC3-2375-41D4-9E03-427CAF2A4C1A}" type="datetimeFigureOut">
               <a:rPr lang="en-US" smtClean="0"/>
-              <a:t>8/29/16</a:t>
+              <a:t>8/30/16</a:t>
             </a:fld>
             <a:endParaRPr lang="en-US" dirty="0"/>
           </a:p>
@@ -2906,7 +2906,7 @@
           <a:p>
             <a:fld id="{AFF16868-8199-4C2C-A5B1-63AEE139F88E}" type="datetimeFigureOut">
               <a:rPr lang="en-US" smtClean="0"/>
-              <a:t>8/29/16</a:t>
+              <a:t>8/30/16</a:t>
             </a:fld>
             <a:endParaRPr lang="en-US" dirty="0"/>
           </a:p>
@@ -4082,7 +4082,7 @@
           <a:p>
             <a:fld id="{AAD9FF7F-6988-44CC-821B-644E70CD2F73}" type="datetimeFigureOut">
               <a:rPr lang="en-US" smtClean="0"/>
-              <a:t>8/29/16</a:t>
+              <a:t>8/30/16</a:t>
             </a:fld>
             <a:endParaRPr lang="en-US" dirty="0"/>
           </a:p>
@@ -5149,7 +5149,7 @@
           <a:p>
             <a:fld id="{5C12C299-16B2-4475-990D-751901EACC14}" type="datetimeFigureOut">
               <a:rPr lang="en-US" smtClean="0"/>
-              <a:t>8/29/16</a:t>
+              <a:t>8/30/16</a:t>
             </a:fld>
             <a:endParaRPr lang="en-US" dirty="0"/>
           </a:p>
@@ -5801,7 +5801,7 @@
           <a:p>
             <a:fld id="{9FE86839-B9D8-4651-8783-F325ECE74E65}" type="datetimeFigureOut">
               <a:rPr lang="en-US" smtClean="0"/>
-              <a:t>8/29/16</a:t>
+              <a:t>8/30/16</a:t>
             </a:fld>
             <a:endParaRPr lang="en-US" dirty="0"/>
           </a:p>
@@ -6654,7 +6654,7 @@
           <a:p>
             <a:fld id="{FD484F64-32F6-45C5-931F-ADC1662401D0}" type="datetimeFigureOut">
               <a:rPr lang="en-US" smtClean="0"/>
-              <a:t>8/29/16</a:t>
+              <a:t>8/30/16</a:t>
             </a:fld>
             <a:endParaRPr lang="en-US" dirty="0"/>
           </a:p>
@@ -6835,7 +6835,7 @@
           <a:p>
             <a:fld id="{53086D93-FCAC-47E0-A2EE-787E62CA814C}" type="datetimeFigureOut">
               <a:rPr lang="en-US" smtClean="0"/>
-              <a:t>8/29/16</a:t>
+              <a:t>8/30/16</a:t>
             </a:fld>
             <a:endParaRPr lang="en-US" dirty="0"/>
           </a:p>
@@ -7839,7 +7839,7 @@
           <a:p>
             <a:fld id="{CDA879A6-0FD0-4734-A311-86BFCA472E6E}" type="datetimeFigureOut">
               <a:rPr lang="en-US" smtClean="0"/>
-              <a:t>8/29/16</a:t>
+              <a:t>8/30/16</a:t>
             </a:fld>
             <a:endParaRPr lang="en-US" dirty="0"/>
           </a:p>
@@ -8051,7 +8051,7 @@
           <a:p>
             <a:fld id="{19C9CA7B-DFD4-44B5-8C60-D14B8CD1FB59}" type="datetimeFigureOut">
               <a:rPr lang="en-US" smtClean="0"/>
-              <a:t>8/29/16</a:t>
+              <a:t>8/30/16</a:t>
             </a:fld>
             <a:endParaRPr lang="en-US" dirty="0"/>
           </a:p>
@@ -9119,7 +9119,7 @@
           <a:p>
             <a:fld id="{F34E6425-0181-43F2-84FC-787E803FD2F8}" type="datetimeFigureOut">
               <a:rPr lang="en-US" smtClean="0"/>
-              <a:t>8/29/16</a:t>
+              <a:t>8/30/16</a:t>
             </a:fld>
             <a:endParaRPr lang="en-US" dirty="0"/>
           </a:p>
@@ -9397,7 +9397,7 @@
           <a:p>
             <a:fld id="{3BDB8791-F1B0-41E7-B7FD-A781E65C4266}" type="datetimeFigureOut">
               <a:rPr lang="en-US" smtClean="0"/>
-              <a:t>8/29/16</a:t>
+              <a:t>8/30/16</a:t>
             </a:fld>
             <a:endParaRPr lang="en-US" dirty="0"/>
           </a:p>
@@ -9785,7 +9785,7 @@
           <a:p>
             <a:fld id="{5FDD63B2-E120-4ED8-B27B-C685F510A5FE}" type="datetimeFigureOut">
               <a:rPr lang="en-US" smtClean="0"/>
-              <a:t>8/29/16</a:t>
+              <a:t>8/30/16</a:t>
             </a:fld>
             <a:endParaRPr lang="en-US" dirty="0"/>
           </a:p>
@@ -9909,7 +9909,7 @@
           <a:p>
             <a:fld id="{7AA18ACC-A947-437B-A130-35BD54FDF1E9}" type="datetimeFigureOut">
               <a:rPr lang="en-US" smtClean="0"/>
-              <a:t>8/29/16</a:t>
+              <a:t>8/30/16</a:t>
             </a:fld>
             <a:endParaRPr lang="en-US" dirty="0"/>
           </a:p>
@@ -10010,7 +10010,7 @@
           <a:p>
             <a:fld id="{7C8D7E02-BCB8-4D50-A234-369438C08659}" type="datetimeFigureOut">
               <a:rPr lang="en-US" smtClean="0"/>
-              <a:t>8/29/16</a:t>
+              <a:t>8/30/16</a:t>
             </a:fld>
             <a:endParaRPr lang="en-US" dirty="0"/>
           </a:p>
@@ -11125,7 +11125,7 @@
           <a:p>
             <a:fld id="{76E86A4C-8E40-4F87-A4F0-01A0687C5742}" type="datetimeFigureOut">
               <a:rPr lang="en-US" smtClean="0"/>
-              <a:t>8/29/16</a:t>
+              <a:t>8/30/16</a:t>
             </a:fld>
             <a:endParaRPr lang="en-US" dirty="0"/>
           </a:p>
@@ -12264,7 +12264,7 @@
           <a:p>
             <a:fld id="{35E72C73-2D91-4E12-BA25-F0AA0C03599B}" type="datetimeFigureOut">
               <a:rPr lang="en-US" smtClean="0"/>
-              <a:t>8/29/16</a:t>
+              <a:t>8/30/16</a:t>
             </a:fld>
             <a:endParaRPr lang="en-US" dirty="0"/>
           </a:p>
@@ -13298,7 +13298,7 @@
           <a:p>
             <a:fld id="{2BE451C3-0FF4-47C4-B829-773ADF60F88C}" type="datetimeFigureOut">
               <a:rPr lang="en-US" smtClean="0"/>
-              <a:t>8/29/16</a:t>
+              <a:t>8/30/16</a:t>
             </a:fld>
             <a:endParaRPr lang="en-US" dirty="0"/>
           </a:p>
@@ -14297,7 +14297,23 @@
           <a:p>
             <a:r>
               <a:rPr lang="en-US" dirty="0" smtClean="0"/>
-              <a:t>1x Carte Micro-SD</a:t>
+              <a:t>1x Carte </a:t>
+            </a:r>
+            <a:r>
+              <a:rPr lang="en-US" dirty="0" smtClean="0"/>
+              <a:t>Micro-SD</a:t>
+            </a:r>
+          </a:p>
+          <a:p>
+            <a:r>
+              <a:rPr lang="en-US" dirty="0" smtClean="0"/>
+              <a:t>1x Bouton</a:t>
+            </a:r>
+          </a:p>
+          <a:p>
+            <a:r>
+              <a:rPr lang="en-US" dirty="0" smtClean="0"/>
+              <a:t>1x LED</a:t>
             </a:r>
             <a:endParaRPr lang="en-US" dirty="0"/>
           </a:p>
@@ -14567,7 +14583,29 @@
           <a:p>
             <a:r>
               <a:rPr lang="en-US" dirty="0" smtClean="0"/>
-              <a:t>Encryption des communications</a:t>
+              <a:t>Encryption des </a:t>
+            </a:r>
+            <a:r>
+              <a:rPr lang="en-US" dirty="0" smtClean="0"/>
+              <a:t>communications</a:t>
+            </a:r>
+          </a:p>
+          <a:p>
+            <a:r>
+              <a:rPr lang="en-US" dirty="0" err="1" smtClean="0"/>
+              <a:t>Authentification</a:t>
+            </a:r>
+            <a:r>
+              <a:rPr lang="en-US" dirty="0" smtClean="0"/>
+              <a:t> des </a:t>
+            </a:r>
+            <a:r>
+              <a:rPr lang="en-US" dirty="0" err="1" smtClean="0"/>
+              <a:t>utilisateurs</a:t>
+            </a:r>
+            <a:r>
+              <a:rPr lang="en-US" dirty="0" smtClean="0"/>
+              <a:t> via un tag NFC</a:t>
             </a:r>
             <a:endParaRPr lang="en-US" dirty="0"/>
           </a:p>

</xml_diff>